<commit_message>
Put sensor data every thoi_gian_do
</commit_message>
<xml_diff>
--- a/ByTech-DNP Hawaco.eMetter Solution.pptx
+++ b/ByTech-DNP Hawaco.eMetter Solution.pptx
@@ -206,7 +206,7 @@
           <a:p>
             <a:fld id="{4EECEC1C-8D3C-4CF2-A0FA-544146648D0D}" type="datetimeFigureOut">
               <a:rPr lang="en-US" smtClean="0"/>
-              <a:t>4/26/2021</a:t>
+              <a:t>5/19/2021</a:t>
             </a:fld>
             <a:endParaRPr lang="en-US"/>
           </a:p>
@@ -1422,7 +1422,7 @@
           <a:p>
             <a:fld id="{C4A9DA0F-AC6D-4823-A81C-C160395E5535}" type="datetime1">
               <a:rPr lang="en-US" smtClean="0"/>
-              <a:t>4/26/2021</a:t>
+              <a:t>5/19/2021</a:t>
             </a:fld>
             <a:endParaRPr lang="en-US"/>
           </a:p>
@@ -1593,7 +1593,7 @@
           <a:p>
             <a:fld id="{2582F72A-D760-4A6D-BE89-F7F6F5E53760}" type="datetime1">
               <a:rPr lang="en-US" smtClean="0"/>
-              <a:t>4/26/2021</a:t>
+              <a:t>5/19/2021</a:t>
             </a:fld>
             <a:endParaRPr lang="en-US"/>
           </a:p>
@@ -1774,7 +1774,7 @@
           <a:p>
             <a:fld id="{CD5705A3-66DE-4368-A31D-137BA0FBB6FB}" type="datetime1">
               <a:rPr lang="en-US" smtClean="0"/>
-              <a:t>4/26/2021</a:t>
+              <a:t>5/19/2021</a:t>
             </a:fld>
             <a:endParaRPr lang="en-US"/>
           </a:p>
@@ -1945,7 +1945,7 @@
           <a:p>
             <a:fld id="{88A20B74-20F9-4015-B6EF-A8C59508BAE2}" type="datetime1">
               <a:rPr lang="en-US" smtClean="0"/>
-              <a:t>4/26/2021</a:t>
+              <a:t>5/19/2021</a:t>
             </a:fld>
             <a:endParaRPr lang="en-US"/>
           </a:p>
@@ -2193,7 +2193,7 @@
           <a:p>
             <a:fld id="{AADE6EFC-3068-4F91-9C7E-282FF9054CE8}" type="datetime1">
               <a:rPr lang="en-US" smtClean="0"/>
-              <a:t>4/26/2021</a:t>
+              <a:t>5/19/2021</a:t>
             </a:fld>
             <a:endParaRPr lang="en-US"/>
           </a:p>
@@ -2425,7 +2425,7 @@
           <a:p>
             <a:fld id="{AA6AB61A-66F8-474B-B04A-A680FB911F5D}" type="datetime1">
               <a:rPr lang="en-US" smtClean="0"/>
-              <a:t>4/26/2021</a:t>
+              <a:t>5/19/2021</a:t>
             </a:fld>
             <a:endParaRPr lang="en-US"/>
           </a:p>
@@ -2792,7 +2792,7 @@
           <a:p>
             <a:fld id="{0CAE1903-B26B-435B-83B5-9E4EE13CED4E}" type="datetime1">
               <a:rPr lang="en-US" smtClean="0"/>
-              <a:t>4/26/2021</a:t>
+              <a:t>5/19/2021</a:t>
             </a:fld>
             <a:endParaRPr lang="en-US"/>
           </a:p>
@@ -2912,7 +2912,7 @@
           <a:p>
             <a:fld id="{95FDCB49-0C4C-40A4-AFB4-8204AE20BFFE}" type="datetime1">
               <a:rPr lang="en-US" smtClean="0"/>
-              <a:t>4/26/2021</a:t>
+              <a:t>5/19/2021</a:t>
             </a:fld>
             <a:endParaRPr lang="en-US"/>
           </a:p>
@@ -3010,7 +3010,7 @@
           <a:p>
             <a:fld id="{BE09B3C3-F752-4922-8C38-074DE7F1DE31}" type="datetime1">
               <a:rPr lang="en-US" smtClean="0"/>
-              <a:t>4/26/2021</a:t>
+              <a:t>5/19/2021</a:t>
             </a:fld>
             <a:endParaRPr lang="en-US"/>
           </a:p>
@@ -3288,7 +3288,7 @@
           <a:p>
             <a:fld id="{9FBE0C84-51A5-4DB3-9082-07FD4B08431E}" type="datetime1">
               <a:rPr lang="en-US" smtClean="0"/>
-              <a:t>4/26/2021</a:t>
+              <a:t>5/19/2021</a:t>
             </a:fld>
             <a:endParaRPr lang="en-US"/>
           </a:p>
@@ -3543,7 +3543,7 @@
           <a:p>
             <a:fld id="{E10BA88F-21CF-47AD-B2F5-DAC1E821635E}" type="datetime1">
               <a:rPr lang="en-US" smtClean="0"/>
-              <a:t>4/26/2021</a:t>
+              <a:t>5/19/2021</a:t>
             </a:fld>
             <a:endParaRPr lang="en-US"/>
           </a:p>
@@ -3757,7 +3757,7 @@
           <a:p>
             <a:fld id="{28DF8372-648C-45A6-AD33-3088C921A327}" type="datetime1">
               <a:rPr lang="en-US" smtClean="0"/>
-              <a:t>4/26/2021</a:t>
+              <a:t>5/19/2021</a:t>
             </a:fld>
             <a:endParaRPr lang="en-US"/>
           </a:p>
@@ -7054,25 +7054,25 @@
           <p:nvPr>
             <p:extLst>
               <p:ext uri="{D42A27DB-BD31-4B8C-83A1-F6EECF244321}">
-                <p14:modId xmlns:p14="http://schemas.microsoft.com/office/powerpoint/2010/main" val="2013266912"/>
+                <p14:modId xmlns:p14="http://schemas.microsoft.com/office/powerpoint/2010/main" val="33063375"/>
               </p:ext>
             </p:extLst>
           </p:nvPr>
         </p:nvGraphicFramePr>
         <p:xfrm>
-          <a:off x="1035201" y="1208235"/>
-          <a:ext cx="10448925" cy="4205287"/>
+          <a:off x="1035050" y="1208088"/>
+          <a:ext cx="9848850" cy="4205287"/>
         </p:xfrm>
         <a:graphic>
           <a:graphicData uri="http://schemas.openxmlformats.org/presentationml/2006/ole">
             <mc:AlternateContent xmlns:mc="http://schemas.openxmlformats.org/markup-compatibility/2006">
               <mc:Choice xmlns:v="urn:schemas-microsoft-com:vml" Requires="v">
-                <p:oleObj name="Worksheet" r:id="rId4" imgW="6648191" imgH="2676394" progId="Excel.Sheet.12">
+                <p:oleObj name="Worksheet" r:id="rId4" imgW="6267544" imgH="2676358" progId="Excel.Sheet.12">
                   <p:embed/>
                 </p:oleObj>
               </mc:Choice>
               <mc:Fallback>
-                <p:oleObj name="Worksheet" r:id="rId4" imgW="6648191" imgH="2676394" progId="Excel.Sheet.12">
+                <p:oleObj name="Worksheet" r:id="rId4" imgW="6267544" imgH="2676358" progId="Excel.Sheet.12">
                   <p:embed/>
                   <p:pic>
                     <p:nvPicPr>
@@ -7088,8 +7088,8 @@
                     </p:blipFill>
                     <p:spPr>
                       <a:xfrm>
-                        <a:off x="1035201" y="1208235"/>
-                        <a:ext cx="10448925" cy="4205287"/>
+                        <a:off x="1035050" y="1208088"/>
+                        <a:ext cx="9848850" cy="4205287"/>
                       </a:xfrm>
                       <a:prstGeom prst="rect">
                         <a:avLst/>

</xml_diff>